<commit_message>
Chap05: last corrections on fig and captions
</commit_message>
<xml_diff>
--- a/05-CrDyn/Pictures/RelaxHeat.pptx
+++ b/05-CrDyn/Pictures/RelaxHeat.pptx
@@ -288,7 +288,7 @@
           <a:p>
             <a:fld id="{CCA2A432-5DCA-439F-942C-901318AA5A35}" type="datetimeFigureOut">
               <a:rPr lang="fr-FR" smtClean="0"/>
-              <a:t>30/06/2017</a:t>
+              <a:t>03/07/2017</a:t>
             </a:fld>
             <a:endParaRPr lang="fr-FR"/>
           </a:p>
@@ -458,7 +458,7 @@
           <a:p>
             <a:fld id="{CCA2A432-5DCA-439F-942C-901318AA5A35}" type="datetimeFigureOut">
               <a:rPr lang="fr-FR" smtClean="0"/>
-              <a:t>30/06/2017</a:t>
+              <a:t>03/07/2017</a:t>
             </a:fld>
             <a:endParaRPr lang="fr-FR"/>
           </a:p>
@@ -638,7 +638,7 @@
           <a:p>
             <a:fld id="{CCA2A432-5DCA-439F-942C-901318AA5A35}" type="datetimeFigureOut">
               <a:rPr lang="fr-FR" smtClean="0"/>
-              <a:t>30/06/2017</a:t>
+              <a:t>03/07/2017</a:t>
             </a:fld>
             <a:endParaRPr lang="fr-FR"/>
           </a:p>
@@ -808,7 +808,7 @@
           <a:p>
             <a:fld id="{CCA2A432-5DCA-439F-942C-901318AA5A35}" type="datetimeFigureOut">
               <a:rPr lang="fr-FR" smtClean="0"/>
-              <a:t>30/06/2017</a:t>
+              <a:t>03/07/2017</a:t>
             </a:fld>
             <a:endParaRPr lang="fr-FR"/>
           </a:p>
@@ -1054,7 +1054,7 @@
           <a:p>
             <a:fld id="{CCA2A432-5DCA-439F-942C-901318AA5A35}" type="datetimeFigureOut">
               <a:rPr lang="fr-FR" smtClean="0"/>
-              <a:t>30/06/2017</a:t>
+              <a:t>03/07/2017</a:t>
             </a:fld>
             <a:endParaRPr lang="fr-FR"/>
           </a:p>
@@ -1342,7 +1342,7 @@
           <a:p>
             <a:fld id="{CCA2A432-5DCA-439F-942C-901318AA5A35}" type="datetimeFigureOut">
               <a:rPr lang="fr-FR" smtClean="0"/>
-              <a:t>30/06/2017</a:t>
+              <a:t>03/07/2017</a:t>
             </a:fld>
             <a:endParaRPr lang="fr-FR"/>
           </a:p>
@@ -1764,7 +1764,7 @@
           <a:p>
             <a:fld id="{CCA2A432-5DCA-439F-942C-901318AA5A35}" type="datetimeFigureOut">
               <a:rPr lang="fr-FR" smtClean="0"/>
-              <a:t>30/06/2017</a:t>
+              <a:t>03/07/2017</a:t>
             </a:fld>
             <a:endParaRPr lang="fr-FR"/>
           </a:p>
@@ -1882,7 +1882,7 @@
           <a:p>
             <a:fld id="{CCA2A432-5DCA-439F-942C-901318AA5A35}" type="datetimeFigureOut">
               <a:rPr lang="fr-FR" smtClean="0"/>
-              <a:t>30/06/2017</a:t>
+              <a:t>03/07/2017</a:t>
             </a:fld>
             <a:endParaRPr lang="fr-FR"/>
           </a:p>
@@ -1977,7 +1977,7 @@
           <a:p>
             <a:fld id="{CCA2A432-5DCA-439F-942C-901318AA5A35}" type="datetimeFigureOut">
               <a:rPr lang="fr-FR" smtClean="0"/>
-              <a:t>30/06/2017</a:t>
+              <a:t>03/07/2017</a:t>
             </a:fld>
             <a:endParaRPr lang="fr-FR"/>
           </a:p>
@@ -2254,7 +2254,7 @@
           <a:p>
             <a:fld id="{CCA2A432-5DCA-439F-942C-901318AA5A35}" type="datetimeFigureOut">
               <a:rPr lang="fr-FR" smtClean="0"/>
-              <a:t>30/06/2017</a:t>
+              <a:t>03/07/2017</a:t>
             </a:fld>
             <a:endParaRPr lang="fr-FR"/>
           </a:p>
@@ -2507,7 +2507,7 @@
           <a:p>
             <a:fld id="{CCA2A432-5DCA-439F-942C-901318AA5A35}" type="datetimeFigureOut">
               <a:rPr lang="fr-FR" smtClean="0"/>
-              <a:t>30/06/2017</a:t>
+              <a:t>03/07/2017</a:t>
             </a:fld>
             <a:endParaRPr lang="fr-FR"/>
           </a:p>
@@ -2720,7 +2720,7 @@
           <a:p>
             <a:fld id="{CCA2A432-5DCA-439F-942C-901318AA5A35}" type="datetimeFigureOut">
               <a:rPr lang="fr-FR" smtClean="0"/>
-              <a:t>30/06/2017</a:t>
+              <a:t>03/07/2017</a:t>
             </a:fld>
             <a:endParaRPr lang="fr-FR"/>
           </a:p>
@@ -4018,6 +4018,249 @@
           </a:p>
         </p:txBody>
       </p:sp>
+      <p:cxnSp>
+        <p:nvCxnSpPr>
+          <p:cNvPr id="3" name="Connecteur droit 2"/>
+          <p:cNvCxnSpPr/>
+          <p:nvPr/>
+        </p:nvCxnSpPr>
+        <p:spPr>
+          <a:xfrm>
+            <a:off x="1746000" y="4697746"/>
+            <a:ext cx="1746000" cy="0"/>
+          </a:xfrm>
+          <a:prstGeom prst="line">
+            <a:avLst/>
+          </a:prstGeom>
+          <a:ln>
+            <a:solidFill>
+              <a:schemeClr val="tx1"/>
+            </a:solidFill>
+            <a:headEnd type="triangle"/>
+            <a:tailEnd type="triangle"/>
+          </a:ln>
+        </p:spPr>
+        <p:style>
+          <a:lnRef idx="1">
+            <a:schemeClr val="accent1"/>
+          </a:lnRef>
+          <a:fillRef idx="0">
+            <a:schemeClr val="accent1"/>
+          </a:fillRef>
+          <a:effectRef idx="0">
+            <a:schemeClr val="accent1"/>
+          </a:effectRef>
+          <a:fontRef idx="minor">
+            <a:schemeClr val="tx1"/>
+          </a:fontRef>
+        </p:style>
+      </p:cxnSp>
+      <p:sp>
+        <p:nvSpPr>
+          <p:cNvPr id="27" name="ZoneTexte 26"/>
+          <p:cNvSpPr txBox="1"/>
+          <p:nvPr/>
+        </p:nvSpPr>
+        <p:spPr>
+          <a:xfrm>
+            <a:off x="2310658" y="4338687"/>
+            <a:ext cx="551754" cy="369332"/>
+          </a:xfrm>
+          <a:prstGeom prst="rect">
+            <a:avLst/>
+          </a:prstGeom>
+          <a:noFill/>
+        </p:spPr>
+        <p:txBody>
+          <a:bodyPr wrap="none" rtlCol="0">
+            <a:spAutoFit/>
+          </a:bodyPr>
+          <a:lstStyle/>
+          <a:p>
+            <a:pPr algn="ctr"/>
+            <a:r>
+              <a:rPr lang="el-GR" dirty="0" smtClean="0">
+                <a:latin typeface="Times New Roman" panose="02020603050405020304" pitchFamily="18" charset="0"/>
+                <a:cs typeface="Times New Roman" panose="02020603050405020304" pitchFamily="18" charset="0"/>
+              </a:rPr>
+              <a:t>τ</a:t>
+            </a:r>
+            <a:r>
+              <a:rPr lang="fr-FR" baseline="-25000" dirty="0" err="1" smtClean="0">
+                <a:latin typeface="Times New Roman" panose="02020603050405020304" pitchFamily="18" charset="0"/>
+                <a:cs typeface="Times New Roman" panose="02020603050405020304" pitchFamily="18" charset="0"/>
+              </a:rPr>
+              <a:t>dark</a:t>
+            </a:r>
+            <a:endParaRPr lang="fr-FR" dirty="0">
+              <a:latin typeface="Times New Roman" panose="02020603050405020304" pitchFamily="18" charset="0"/>
+              <a:cs typeface="Times New Roman" panose="02020603050405020304" pitchFamily="18" charset="0"/>
+            </a:endParaRPr>
+          </a:p>
+        </p:txBody>
+      </p:sp>
+      <p:cxnSp>
+        <p:nvCxnSpPr>
+          <p:cNvPr id="31" name="Connecteur droit 30"/>
+          <p:cNvCxnSpPr/>
+          <p:nvPr/>
+        </p:nvCxnSpPr>
+        <p:spPr>
+          <a:xfrm>
+            <a:off x="9469340" y="2067824"/>
+            <a:ext cx="1746000" cy="0"/>
+          </a:xfrm>
+          <a:prstGeom prst="line">
+            <a:avLst/>
+          </a:prstGeom>
+          <a:ln>
+            <a:solidFill>
+              <a:schemeClr val="tx1"/>
+            </a:solidFill>
+            <a:headEnd type="none"/>
+            <a:tailEnd type="triangle"/>
+          </a:ln>
+        </p:spPr>
+        <p:style>
+          <a:lnRef idx="1">
+            <a:schemeClr val="accent1"/>
+          </a:lnRef>
+          <a:fillRef idx="0">
+            <a:schemeClr val="accent1"/>
+          </a:fillRef>
+          <a:effectRef idx="0">
+            <a:schemeClr val="accent1"/>
+          </a:effectRef>
+          <a:fontRef idx="minor">
+            <a:schemeClr val="tx1"/>
+          </a:fontRef>
+        </p:style>
+      </p:cxnSp>
+      <p:sp>
+        <p:nvSpPr>
+          <p:cNvPr id="32" name="ZoneTexte 31"/>
+          <p:cNvSpPr txBox="1"/>
+          <p:nvPr/>
+        </p:nvSpPr>
+        <p:spPr>
+          <a:xfrm>
+            <a:off x="10066463" y="1665099"/>
+            <a:ext cx="551754" cy="369332"/>
+          </a:xfrm>
+          <a:prstGeom prst="rect">
+            <a:avLst/>
+          </a:prstGeom>
+          <a:noFill/>
+        </p:spPr>
+        <p:txBody>
+          <a:bodyPr wrap="none" rtlCol="0">
+            <a:spAutoFit/>
+          </a:bodyPr>
+          <a:lstStyle/>
+          <a:p>
+            <a:pPr algn="ctr"/>
+            <a:r>
+              <a:rPr lang="el-GR" dirty="0" smtClean="0">
+                <a:latin typeface="Times New Roman" panose="02020603050405020304" pitchFamily="18" charset="0"/>
+                <a:cs typeface="Times New Roman" panose="02020603050405020304" pitchFamily="18" charset="0"/>
+              </a:rPr>
+              <a:t>τ</a:t>
+            </a:r>
+            <a:r>
+              <a:rPr lang="fr-FR" baseline="-25000" dirty="0" err="1" smtClean="0">
+                <a:latin typeface="Times New Roman" panose="02020603050405020304" pitchFamily="18" charset="0"/>
+                <a:cs typeface="Times New Roman" panose="02020603050405020304" pitchFamily="18" charset="0"/>
+              </a:rPr>
+              <a:t>dark</a:t>
+            </a:r>
+            <a:endParaRPr lang="fr-FR" dirty="0">
+              <a:latin typeface="Times New Roman" panose="02020603050405020304" pitchFamily="18" charset="0"/>
+              <a:cs typeface="Times New Roman" panose="02020603050405020304" pitchFamily="18" charset="0"/>
+            </a:endParaRPr>
+          </a:p>
+        </p:txBody>
+      </p:sp>
+      <p:cxnSp>
+        <p:nvCxnSpPr>
+          <p:cNvPr id="33" name="Connecteur droit 32"/>
+          <p:cNvCxnSpPr/>
+          <p:nvPr/>
+        </p:nvCxnSpPr>
+        <p:spPr>
+          <a:xfrm>
+            <a:off x="11935420" y="2069454"/>
+            <a:ext cx="1306936" cy="0"/>
+          </a:xfrm>
+          <a:prstGeom prst="line">
+            <a:avLst/>
+          </a:prstGeom>
+          <a:ln>
+            <a:solidFill>
+              <a:schemeClr val="tx1"/>
+            </a:solidFill>
+            <a:headEnd type="triangle"/>
+            <a:tailEnd type="none"/>
+          </a:ln>
+        </p:spPr>
+        <p:style>
+          <a:lnRef idx="1">
+            <a:schemeClr val="accent1"/>
+          </a:lnRef>
+          <a:fillRef idx="0">
+            <a:schemeClr val="accent1"/>
+          </a:fillRef>
+          <a:effectRef idx="0">
+            <a:schemeClr val="accent1"/>
+          </a:effectRef>
+          <a:fontRef idx="minor">
+            <a:schemeClr val="tx1"/>
+          </a:fontRef>
+        </p:style>
+      </p:cxnSp>
+      <p:sp>
+        <p:nvSpPr>
+          <p:cNvPr id="35" name="ZoneTexte 34"/>
+          <p:cNvSpPr txBox="1"/>
+          <p:nvPr/>
+        </p:nvSpPr>
+        <p:spPr>
+          <a:xfrm>
+            <a:off x="12319770" y="1665099"/>
+            <a:ext cx="551754" cy="369332"/>
+          </a:xfrm>
+          <a:prstGeom prst="rect">
+            <a:avLst/>
+          </a:prstGeom>
+          <a:noFill/>
+        </p:spPr>
+        <p:txBody>
+          <a:bodyPr wrap="none" rtlCol="0">
+            <a:spAutoFit/>
+          </a:bodyPr>
+          <a:lstStyle/>
+          <a:p>
+            <a:pPr algn="ctr"/>
+            <a:r>
+              <a:rPr lang="el-GR" dirty="0" smtClean="0">
+                <a:latin typeface="Times New Roman" panose="02020603050405020304" pitchFamily="18" charset="0"/>
+                <a:cs typeface="Times New Roman" panose="02020603050405020304" pitchFamily="18" charset="0"/>
+              </a:rPr>
+              <a:t>τ</a:t>
+            </a:r>
+            <a:r>
+              <a:rPr lang="fr-FR" baseline="-25000" dirty="0" err="1" smtClean="0">
+                <a:latin typeface="Times New Roman" panose="02020603050405020304" pitchFamily="18" charset="0"/>
+                <a:cs typeface="Times New Roman" panose="02020603050405020304" pitchFamily="18" charset="0"/>
+              </a:rPr>
+              <a:t>dark</a:t>
+            </a:r>
+            <a:endParaRPr lang="fr-FR" dirty="0">
+              <a:latin typeface="Times New Roman" panose="02020603050405020304" pitchFamily="18" charset="0"/>
+              <a:cs typeface="Times New Roman" panose="02020603050405020304" pitchFamily="18" charset="0"/>
+            </a:endParaRPr>
+          </a:p>
+        </p:txBody>
+      </p:sp>
     </p:spTree>
     <p:extLst>
       <p:ext uri="{BB962C8B-B14F-4D97-AF65-F5344CB8AC3E}">

</xml_diff>